<commit_message>
Added Git Hub link
</commit_message>
<xml_diff>
--- a/IIT Roorkee_Cloudxlab_Capstone Project_NER -LSTM/Capstone_project_presentation.pptx
+++ b/IIT Roorkee_Cloudxlab_Capstone Project_NER -LSTM/Capstone_project_presentation.pptx
@@ -116,7 +116,24 @@
       </a:defRPr>
     </a:lvl9pPr>
   </p:defaultTextStyle>
+  <p:extLst>
+    <p:ext uri="{EFAFB233-063F-42B5-8137-9DF3F51BA10A}">
+      <p15:sldGuideLst xmlns:p15="http://schemas.microsoft.com/office/powerpoint/2012/main"/>
+    </p:ext>
+  </p:extLst>
 </p:presentation>
+</file>
+
+<file path=ppt/commentAuthors.xml><?xml version="1.0" encoding="utf-8"?>
+<p:cmAuthorLst xmlns:a="http://schemas.openxmlformats.org/drawingml/2006/main" xmlns:r="http://schemas.openxmlformats.org/officeDocument/2006/relationships" xmlns:p="http://schemas.openxmlformats.org/presentationml/2006/main">
+  <p:cmAuthor id="1" name="Latha Chandran" initials="LC" lastIdx="1" clrIdx="0">
+    <p:extLst>
+      <p:ext uri="{19B8F6BF-5375-455C-9EA6-DF929625EA0E}">
+        <p15:presenceInfo xmlns:p15="http://schemas.microsoft.com/office/powerpoint/2012/main" userId="69cf0f2d4e832e58" providerId="Windows Live"/>
+      </p:ext>
+    </p:extLst>
+  </p:cmAuthor>
+</p:cmAuthorLst>
 </file>
 
 <file path=ppt/slideLayouts/slideLayout1.xml><?xml version="1.0" encoding="utf-8"?>
@@ -5882,7 +5899,12 @@
             <p:ph type="subTitle" idx="1"/>
           </p:nvPr>
         </p:nvSpPr>
-        <p:spPr/>
+        <p:spPr>
+          <a:xfrm>
+            <a:off x="1507067" y="4053654"/>
+            <a:ext cx="7766936" cy="1096899"/>
+          </a:xfrm>
+        </p:spPr>
         <p:txBody>
           <a:bodyPr>
             <a:normAutofit/>
@@ -5893,6 +5915,281 @@
               <a:rPr lang="en-IN" sz="2800" dirty="0"/>
               <a:t>Manu Raj L S</a:t>
             </a:r>
+          </a:p>
+        </p:txBody>
+      </p:sp>
+      <p:sp>
+        <p:nvSpPr>
+          <p:cNvPr id="6" name="Subtitle 2">
+            <a:extLst>
+              <a:ext uri="{FF2B5EF4-FFF2-40B4-BE49-F238E27FC236}">
+                <a16:creationId xmlns:a16="http://schemas.microsoft.com/office/drawing/2014/main" id="{1F13F9B5-E65D-329A-0153-1A775A846A1B}"/>
+              </a:ext>
+            </a:extLst>
+          </p:cNvPr>
+          <p:cNvSpPr txBox="1">
+            <a:spLocks/>
+          </p:cNvSpPr>
+          <p:nvPr/>
+        </p:nvSpPr>
+        <p:spPr>
+          <a:xfrm>
+            <a:off x="1507067" y="4945794"/>
+            <a:ext cx="7766936" cy="1096899"/>
+          </a:xfrm>
+          <a:prstGeom prst="rect">
+            <a:avLst/>
+          </a:prstGeom>
+        </p:spPr>
+        <p:txBody>
+          <a:bodyPr vert="horz" lIns="91440" tIns="45720" rIns="91440" bIns="45720" rtlCol="0" anchor="t">
+            <a:normAutofit/>
+          </a:bodyPr>
+          <a:lstStyle>
+            <a:lvl1pPr marL="0" indent="0" algn="r" defTabSz="457200" rtl="0" eaLnBrk="1" latinLnBrk="0" hangingPunct="1">
+              <a:spcBef>
+                <a:spcPts val="1000"/>
+              </a:spcBef>
+              <a:spcAft>
+                <a:spcPts val="0"/>
+              </a:spcAft>
+              <a:buClr>
+                <a:schemeClr val="accent1">
+                  <a:lumMod val="75000"/>
+                </a:schemeClr>
+              </a:buClr>
+              <a:buSzPct val="80000"/>
+              <a:buFont typeface="Wingdings 3" charset="2"/>
+              <a:buNone/>
+              <a:defRPr sz="1800" kern="1200">
+                <a:solidFill>
+                  <a:schemeClr val="tx1">
+                    <a:lumMod val="50000"/>
+                    <a:lumOff val="50000"/>
+                  </a:schemeClr>
+                </a:solidFill>
+                <a:latin typeface="+mn-lt"/>
+                <a:ea typeface="+mn-ea"/>
+                <a:cs typeface="+mn-cs"/>
+              </a:defRPr>
+            </a:lvl1pPr>
+            <a:lvl2pPr marL="457200" indent="0" algn="ctr" defTabSz="457200" rtl="0" eaLnBrk="1" latinLnBrk="0" hangingPunct="1">
+              <a:spcBef>
+                <a:spcPts val="1000"/>
+              </a:spcBef>
+              <a:spcAft>
+                <a:spcPts val="0"/>
+              </a:spcAft>
+              <a:buClr>
+                <a:schemeClr val="accent1">
+                  <a:lumMod val="75000"/>
+                </a:schemeClr>
+              </a:buClr>
+              <a:buSzPct val="80000"/>
+              <a:buFont typeface="Wingdings 3" charset="2"/>
+              <a:buNone/>
+              <a:defRPr sz="1600" kern="1200">
+                <a:solidFill>
+                  <a:schemeClr val="tx1">
+                    <a:tint val="75000"/>
+                  </a:schemeClr>
+                </a:solidFill>
+                <a:latin typeface="+mn-lt"/>
+                <a:ea typeface="+mn-ea"/>
+                <a:cs typeface="+mn-cs"/>
+              </a:defRPr>
+            </a:lvl2pPr>
+            <a:lvl3pPr marL="914400" indent="0" algn="ctr" defTabSz="457200" rtl="0" eaLnBrk="1" latinLnBrk="0" hangingPunct="1">
+              <a:spcBef>
+                <a:spcPts val="1000"/>
+              </a:spcBef>
+              <a:spcAft>
+                <a:spcPts val="0"/>
+              </a:spcAft>
+              <a:buClr>
+                <a:schemeClr val="accent1">
+                  <a:lumMod val="75000"/>
+                </a:schemeClr>
+              </a:buClr>
+              <a:buSzPct val="80000"/>
+              <a:buFont typeface="Wingdings 3" charset="2"/>
+              <a:buNone/>
+              <a:defRPr sz="1400" kern="1200">
+                <a:solidFill>
+                  <a:schemeClr val="tx1">
+                    <a:tint val="75000"/>
+                  </a:schemeClr>
+                </a:solidFill>
+                <a:latin typeface="+mn-lt"/>
+                <a:ea typeface="+mn-ea"/>
+                <a:cs typeface="+mn-cs"/>
+              </a:defRPr>
+            </a:lvl3pPr>
+            <a:lvl4pPr marL="1371600" indent="0" algn="ctr" defTabSz="457200" rtl="0" eaLnBrk="1" latinLnBrk="0" hangingPunct="1">
+              <a:spcBef>
+                <a:spcPts val="1000"/>
+              </a:spcBef>
+              <a:spcAft>
+                <a:spcPts val="0"/>
+              </a:spcAft>
+              <a:buClr>
+                <a:schemeClr val="accent1">
+                  <a:lumMod val="75000"/>
+                </a:schemeClr>
+              </a:buClr>
+              <a:buSzPct val="80000"/>
+              <a:buFont typeface="Wingdings 3" charset="2"/>
+              <a:buNone/>
+              <a:defRPr sz="1200" kern="1200">
+                <a:solidFill>
+                  <a:schemeClr val="tx1">
+                    <a:tint val="75000"/>
+                  </a:schemeClr>
+                </a:solidFill>
+                <a:latin typeface="+mn-lt"/>
+                <a:ea typeface="+mn-ea"/>
+                <a:cs typeface="+mn-cs"/>
+              </a:defRPr>
+            </a:lvl4pPr>
+            <a:lvl5pPr marL="1828800" indent="0" algn="ctr" defTabSz="457200" rtl="0" eaLnBrk="1" latinLnBrk="0" hangingPunct="1">
+              <a:spcBef>
+                <a:spcPts val="1000"/>
+              </a:spcBef>
+              <a:spcAft>
+                <a:spcPts val="0"/>
+              </a:spcAft>
+              <a:buClr>
+                <a:schemeClr val="accent1">
+                  <a:lumMod val="75000"/>
+                </a:schemeClr>
+              </a:buClr>
+              <a:buSzPct val="80000"/>
+              <a:buFont typeface="Wingdings 3" charset="2"/>
+              <a:buNone/>
+              <a:defRPr sz="1200" kern="1200">
+                <a:solidFill>
+                  <a:schemeClr val="tx1">
+                    <a:tint val="75000"/>
+                  </a:schemeClr>
+                </a:solidFill>
+                <a:latin typeface="+mn-lt"/>
+                <a:ea typeface="+mn-ea"/>
+                <a:cs typeface="+mn-cs"/>
+              </a:defRPr>
+            </a:lvl5pPr>
+            <a:lvl6pPr marL="2286000" indent="0" algn="ctr" defTabSz="457200" rtl="0" eaLnBrk="1" latinLnBrk="0" hangingPunct="1">
+              <a:spcBef>
+                <a:spcPts val="1000"/>
+              </a:spcBef>
+              <a:spcAft>
+                <a:spcPts val="0"/>
+              </a:spcAft>
+              <a:buClr>
+                <a:schemeClr val="accent1">
+                  <a:lumMod val="75000"/>
+                </a:schemeClr>
+              </a:buClr>
+              <a:buSzPct val="80000"/>
+              <a:buFont typeface="Wingdings 3" charset="2"/>
+              <a:buNone/>
+              <a:defRPr sz="1200" kern="1200">
+                <a:solidFill>
+                  <a:schemeClr val="tx1">
+                    <a:tint val="75000"/>
+                  </a:schemeClr>
+                </a:solidFill>
+                <a:latin typeface="+mn-lt"/>
+                <a:ea typeface="+mn-ea"/>
+                <a:cs typeface="+mn-cs"/>
+              </a:defRPr>
+            </a:lvl6pPr>
+            <a:lvl7pPr marL="2743200" indent="0" algn="ctr" defTabSz="457200" rtl="0" eaLnBrk="1" latinLnBrk="0" hangingPunct="1">
+              <a:spcBef>
+                <a:spcPts val="1000"/>
+              </a:spcBef>
+              <a:spcAft>
+                <a:spcPts val="0"/>
+              </a:spcAft>
+              <a:buClr>
+                <a:schemeClr val="accent1">
+                  <a:lumMod val="75000"/>
+                </a:schemeClr>
+              </a:buClr>
+              <a:buSzPct val="80000"/>
+              <a:buFont typeface="Wingdings 3" charset="2"/>
+              <a:buNone/>
+              <a:defRPr sz="1200" kern="1200">
+                <a:solidFill>
+                  <a:schemeClr val="tx1">
+                    <a:tint val="75000"/>
+                  </a:schemeClr>
+                </a:solidFill>
+                <a:latin typeface="+mn-lt"/>
+                <a:ea typeface="+mn-ea"/>
+                <a:cs typeface="+mn-cs"/>
+              </a:defRPr>
+            </a:lvl7pPr>
+            <a:lvl8pPr marL="3200400" indent="0" algn="ctr" defTabSz="457200" rtl="0" eaLnBrk="1" latinLnBrk="0" hangingPunct="1">
+              <a:spcBef>
+                <a:spcPts val="1000"/>
+              </a:spcBef>
+              <a:spcAft>
+                <a:spcPts val="0"/>
+              </a:spcAft>
+              <a:buClr>
+                <a:schemeClr val="accent1">
+                  <a:lumMod val="75000"/>
+                </a:schemeClr>
+              </a:buClr>
+              <a:buSzPct val="80000"/>
+              <a:buFont typeface="Wingdings 3" charset="2"/>
+              <a:buNone/>
+              <a:defRPr sz="1200" kern="1200">
+                <a:solidFill>
+                  <a:schemeClr val="tx1">
+                    <a:tint val="75000"/>
+                  </a:schemeClr>
+                </a:solidFill>
+                <a:latin typeface="+mn-lt"/>
+                <a:ea typeface="+mn-ea"/>
+                <a:cs typeface="+mn-cs"/>
+              </a:defRPr>
+            </a:lvl8pPr>
+            <a:lvl9pPr marL="3657600" indent="0" algn="ctr" defTabSz="457200" rtl="0" eaLnBrk="1" latinLnBrk="0" hangingPunct="1">
+              <a:spcBef>
+                <a:spcPts val="1000"/>
+              </a:spcBef>
+              <a:spcAft>
+                <a:spcPts val="0"/>
+              </a:spcAft>
+              <a:buClr>
+                <a:schemeClr val="accent1">
+                  <a:lumMod val="75000"/>
+                </a:schemeClr>
+              </a:buClr>
+              <a:buSzPct val="80000"/>
+              <a:buFont typeface="Wingdings 3" charset="2"/>
+              <a:buNone/>
+              <a:defRPr sz="1200" kern="1200">
+                <a:solidFill>
+                  <a:schemeClr val="tx1">
+                    <a:tint val="75000"/>
+                  </a:schemeClr>
+                </a:solidFill>
+                <a:latin typeface="+mn-lt"/>
+                <a:ea typeface="+mn-ea"/>
+                <a:cs typeface="+mn-cs"/>
+              </a:defRPr>
+            </a:lvl9pPr>
+          </a:lstStyle>
+          <a:p>
+            <a:r>
+              <a:rPr lang="en-IN" sz="2800" dirty="0">
+                <a:hlinkClick r:id="rId2"/>
+              </a:rPr>
+              <a:t>GIT Hub Link </a:t>
+            </a:r>
+            <a:endParaRPr lang="en-IN" sz="2800" dirty="0"/>
           </a:p>
         </p:txBody>
       </p:sp>

</xml_diff>